<commit_message>
Illustration for chapter "Modelo Matemático"
</commit_message>
<xml_diff>
--- a/images/mathematical_model/collision_geometry.pptx
+++ b/images/mathematical_model/collision_geometry.pptx
@@ -247,7 +247,7 @@
           <a:p>
             <a:fld id="{8844AE1E-3EE1-4005-B3A9-D0DB6601EE44}" type="datetimeFigureOut">
               <a:rPr lang="pt-BR" smtClean="0"/>
-              <a:t>08/12/2017</a:t>
+              <a:t>09/12/2017</a:t>
             </a:fld>
             <a:endParaRPr lang="pt-BR"/>
           </a:p>
@@ -417,7 +417,7 @@
           <a:p>
             <a:fld id="{8844AE1E-3EE1-4005-B3A9-D0DB6601EE44}" type="datetimeFigureOut">
               <a:rPr lang="pt-BR" smtClean="0"/>
-              <a:t>08/12/2017</a:t>
+              <a:t>09/12/2017</a:t>
             </a:fld>
             <a:endParaRPr lang="pt-BR"/>
           </a:p>
@@ -597,7 +597,7 @@
           <a:p>
             <a:fld id="{8844AE1E-3EE1-4005-B3A9-D0DB6601EE44}" type="datetimeFigureOut">
               <a:rPr lang="pt-BR" smtClean="0"/>
-              <a:t>08/12/2017</a:t>
+              <a:t>09/12/2017</a:t>
             </a:fld>
             <a:endParaRPr lang="pt-BR"/>
           </a:p>
@@ -767,7 +767,7 @@
           <a:p>
             <a:fld id="{8844AE1E-3EE1-4005-B3A9-D0DB6601EE44}" type="datetimeFigureOut">
               <a:rPr lang="pt-BR" smtClean="0"/>
-              <a:t>08/12/2017</a:t>
+              <a:t>09/12/2017</a:t>
             </a:fld>
             <a:endParaRPr lang="pt-BR"/>
           </a:p>
@@ -1011,7 +1011,7 @@
           <a:p>
             <a:fld id="{8844AE1E-3EE1-4005-B3A9-D0DB6601EE44}" type="datetimeFigureOut">
               <a:rPr lang="pt-BR" smtClean="0"/>
-              <a:t>08/12/2017</a:t>
+              <a:t>09/12/2017</a:t>
             </a:fld>
             <a:endParaRPr lang="pt-BR"/>
           </a:p>
@@ -1243,7 +1243,7 @@
           <a:p>
             <a:fld id="{8844AE1E-3EE1-4005-B3A9-D0DB6601EE44}" type="datetimeFigureOut">
               <a:rPr lang="pt-BR" smtClean="0"/>
-              <a:t>08/12/2017</a:t>
+              <a:t>09/12/2017</a:t>
             </a:fld>
             <a:endParaRPr lang="pt-BR"/>
           </a:p>
@@ -1610,7 +1610,7 @@
           <a:p>
             <a:fld id="{8844AE1E-3EE1-4005-B3A9-D0DB6601EE44}" type="datetimeFigureOut">
               <a:rPr lang="pt-BR" smtClean="0"/>
-              <a:t>08/12/2017</a:t>
+              <a:t>09/12/2017</a:t>
             </a:fld>
             <a:endParaRPr lang="pt-BR"/>
           </a:p>
@@ -1728,7 +1728,7 @@
           <a:p>
             <a:fld id="{8844AE1E-3EE1-4005-B3A9-D0DB6601EE44}" type="datetimeFigureOut">
               <a:rPr lang="pt-BR" smtClean="0"/>
-              <a:t>08/12/2017</a:t>
+              <a:t>09/12/2017</a:t>
             </a:fld>
             <a:endParaRPr lang="pt-BR"/>
           </a:p>
@@ -1823,7 +1823,7 @@
           <a:p>
             <a:fld id="{8844AE1E-3EE1-4005-B3A9-D0DB6601EE44}" type="datetimeFigureOut">
               <a:rPr lang="pt-BR" smtClean="0"/>
-              <a:t>08/12/2017</a:t>
+              <a:t>09/12/2017</a:t>
             </a:fld>
             <a:endParaRPr lang="pt-BR"/>
           </a:p>
@@ -2100,7 +2100,7 @@
           <a:p>
             <a:fld id="{8844AE1E-3EE1-4005-B3A9-D0DB6601EE44}" type="datetimeFigureOut">
               <a:rPr lang="pt-BR" smtClean="0"/>
-              <a:t>08/12/2017</a:t>
+              <a:t>09/12/2017</a:t>
             </a:fld>
             <a:endParaRPr lang="pt-BR"/>
           </a:p>
@@ -2357,7 +2357,7 @@
           <a:p>
             <a:fld id="{8844AE1E-3EE1-4005-B3A9-D0DB6601EE44}" type="datetimeFigureOut">
               <a:rPr lang="pt-BR" smtClean="0"/>
-              <a:t>08/12/2017</a:t>
+              <a:t>09/12/2017</a:t>
             </a:fld>
             <a:endParaRPr lang="pt-BR"/>
           </a:p>
@@ -2570,7 +2570,7 @@
           <a:p>
             <a:fld id="{8844AE1E-3EE1-4005-B3A9-D0DB6601EE44}" type="datetimeFigureOut">
               <a:rPr lang="pt-BR" smtClean="0"/>
-              <a:t>08/12/2017</a:t>
+              <a:t>09/12/2017</a:t>
             </a:fld>
             <a:endParaRPr lang="pt-BR"/>
           </a:p>
@@ -2996,7 +2996,7 @@
             <a:avLst/>
           </a:prstGeom>
           <a:noFill/>
-          <a:ln w="63500">
+          <a:ln w="76200">
             <a:solidFill>
               <a:srgbClr val="FF0000"/>
             </a:solidFill>
@@ -3048,7 +3048,7 @@
             <a:avLst/>
           </a:prstGeom>
           <a:noFill/>
-          <a:ln w="63500">
+          <a:ln w="76200">
             <a:solidFill>
               <a:srgbClr val="0070C0"/>
             </a:solidFill>

</xml_diff>